<commit_message>
Updated terminology to refer to use VDR
</commit_message>
<xml_diff>
--- a/src/HBB-DID-Resolver-Architecture v0.1.pptx
+++ b/src/HBB-DID-Resolver-Architecture v0.1.pptx
@@ -6,6 +6,7 @@
   </p:sldMasterIdLst>
   <p:sldIdLst>
     <p:sldId id="256" r:id="rId2"/>
+    <p:sldId id="257" r:id="rId3"/>
   </p:sldIdLst>
   <p:sldSz cx="6119813" cy="5400675"/>
   <p:notesSz cx="6858000" cy="9144000"/>
@@ -104,6 +105,11 @@
       </a:defRPr>
     </a:lvl9pPr>
   </p:defaultTextStyle>
+  <p:extLst>
+    <p:ext uri="{EFAFB233-063F-42B5-8137-9DF3F51BA10A}">
+      <p15:sldGuideLst xmlns:p15="http://schemas.microsoft.com/office/powerpoint/2012/main"/>
+    </p:ext>
+  </p:extLst>
 </p:presentation>
 </file>
 
@@ -4609,6 +4615,1662 @@
 </p:sld>
 </file>
 
+<file path=ppt/slides/slide2.xml><?xml version="1.0" encoding="utf-8"?>
+<p:sld xmlns:a="http://schemas.openxmlformats.org/drawingml/2006/main" xmlns:r="http://schemas.openxmlformats.org/officeDocument/2006/relationships" xmlns:p="http://schemas.openxmlformats.org/presentationml/2006/main">
+  <p:cSld>
+    <p:spTree>
+      <p:nvGrpSpPr>
+        <p:cNvPr id="1" name=""/>
+        <p:cNvGrpSpPr/>
+        <p:nvPr/>
+      </p:nvGrpSpPr>
+      <p:grpSpPr>
+        <a:xfrm>
+          <a:off x="0" y="0"/>
+          <a:ext cx="0" cy="0"/>
+          <a:chOff x="0" y="0"/>
+          <a:chExt cx="0" cy="0"/>
+        </a:xfrm>
+      </p:grpSpPr>
+      <p:graphicFrame>
+        <p:nvGraphicFramePr>
+          <p:cNvPr id="84" name="Table 83">
+            <a:extLst>
+              <a:ext uri="{FF2B5EF4-FFF2-40B4-BE49-F238E27FC236}">
+                <a16:creationId xmlns:a16="http://schemas.microsoft.com/office/drawing/2014/main" id="{7254B72B-FC08-4342-B7B9-168B3E69EFE2}"/>
+              </a:ext>
+            </a:extLst>
+          </p:cNvPr>
+          <p:cNvGraphicFramePr>
+            <a:graphicFrameLocks noGrp="1"/>
+          </p:cNvGraphicFramePr>
+          <p:nvPr>
+            <p:extLst/>
+          </p:nvPr>
+        </p:nvGraphicFramePr>
+        <p:xfrm>
+          <a:off x="773323" y="209551"/>
+          <a:ext cx="5222748" cy="4163778"/>
+        </p:xfrm>
+        <a:graphic>
+          <a:graphicData uri="http://schemas.openxmlformats.org/drawingml/2006/table">
+            <a:tbl>
+              <a:tblPr firstRow="1" bandRow="1">
+                <a:effectLst/>
+              </a:tblPr>
+              <a:tblGrid>
+                <a:gridCol w="2601735">
+                  <a:extLst>
+                    <a:ext uri="{9D8B030D-6E8A-4147-A177-3AD203B41FA5}">
+                      <a16:colId xmlns:a16="http://schemas.microsoft.com/office/drawing/2014/main" val="3297454745"/>
+                    </a:ext>
+                  </a:extLst>
+                </a:gridCol>
+                <a:gridCol w="2621013">
+                  <a:extLst>
+                    <a:ext uri="{9D8B030D-6E8A-4147-A177-3AD203B41FA5}">
+                      <a16:colId xmlns:a16="http://schemas.microsoft.com/office/drawing/2014/main" val="1109123982"/>
+                    </a:ext>
+                  </a:extLst>
+                </a:gridCol>
+              </a:tblGrid>
+              <a:tr h="2081889">
+                <a:tc>
+                  <a:txBody>
+                    <a:bodyPr/>
+                    <a:lstStyle/>
+                    <a:p>
+                      <a:pPr algn="ctr"/>
+                      <a:r>
+                        <a:rPr lang="en-US" sz="1400" dirty="0"/>
+                        <a:t>DID Resolver Lightweight Service</a:t>
+                      </a:r>
+                    </a:p>
+                  </a:txBody>
+                  <a:tcPr>
+                    <a:solidFill>
+                      <a:schemeClr val="bg1">
+                        <a:lumMod val="95000"/>
+                      </a:schemeClr>
+                    </a:solidFill>
+                  </a:tcPr>
+                </a:tc>
+                <a:tc>
+                  <a:txBody>
+                    <a:bodyPr/>
+                    <a:lstStyle/>
+                    <a:p>
+                      <a:pPr marL="0" marR="0" lvl="0" indent="0" algn="ctr" defTabSz="914400" rtl="0" eaLnBrk="1" fontAlgn="auto" latinLnBrk="0" hangingPunct="1">
+                        <a:lnSpc>
+                          <a:spcPct val="100000"/>
+                        </a:lnSpc>
+                        <a:spcBef>
+                          <a:spcPts val="0"/>
+                        </a:spcBef>
+                        <a:spcAft>
+                          <a:spcPts val="0"/>
+                        </a:spcAft>
+                        <a:buClrTx/>
+                        <a:buSzTx/>
+                        <a:buFontTx/>
+                        <a:buNone/>
+                        <a:tabLst/>
+                        <a:defRPr/>
+                      </a:pPr>
+                      <a:r>
+                        <a:rPr lang="en-US" sz="1400" dirty="0"/>
+                        <a:t>DID Resolver Lightweight Node</a:t>
+                      </a:r>
+                    </a:p>
+                    <a:p>
+                      <a:pPr algn="ctr"/>
+                      <a:endParaRPr lang="en-US" sz="1400" dirty="0"/>
+                    </a:p>
+                  </a:txBody>
+                  <a:tcPr>
+                    <a:solidFill>
+                      <a:schemeClr val="bg1">
+                        <a:lumMod val="95000"/>
+                      </a:schemeClr>
+                    </a:solidFill>
+                  </a:tcPr>
+                </a:tc>
+                <a:extLst>
+                  <a:ext uri="{0D108BD9-81ED-4DB2-BD59-A6C34878D82A}">
+                    <a16:rowId xmlns:a16="http://schemas.microsoft.com/office/drawing/2014/main" val="741202683"/>
+                  </a:ext>
+                </a:extLst>
+              </a:tr>
+              <a:tr h="2081889">
+                <a:tc>
+                  <a:txBody>
+                    <a:bodyPr/>
+                    <a:lstStyle/>
+                    <a:p>
+                      <a:pPr algn="ctr"/>
+                      <a:r>
+                        <a:rPr lang="en-US" sz="1400" dirty="0"/>
+                        <a:t>DID Resolver Full Service</a:t>
+                      </a:r>
+                    </a:p>
+                  </a:txBody>
+                  <a:tcPr>
+                    <a:solidFill>
+                      <a:schemeClr val="bg1">
+                        <a:lumMod val="95000"/>
+                      </a:schemeClr>
+                    </a:solidFill>
+                  </a:tcPr>
+                </a:tc>
+                <a:tc>
+                  <a:txBody>
+                    <a:bodyPr/>
+                    <a:lstStyle/>
+                    <a:p>
+                      <a:pPr algn="ctr"/>
+                      <a:r>
+                        <a:rPr lang="en-US" sz="1400" dirty="0"/>
+                        <a:t>DID Resolver Full Node</a:t>
+                      </a:r>
+                    </a:p>
+                  </a:txBody>
+                  <a:tcPr>
+                    <a:solidFill>
+                      <a:schemeClr val="bg1">
+                        <a:lumMod val="95000"/>
+                      </a:schemeClr>
+                    </a:solidFill>
+                  </a:tcPr>
+                </a:tc>
+                <a:extLst>
+                  <a:ext uri="{0D108BD9-81ED-4DB2-BD59-A6C34878D82A}">
+                    <a16:rowId xmlns:a16="http://schemas.microsoft.com/office/drawing/2014/main" val="2877061925"/>
+                  </a:ext>
+                </a:extLst>
+              </a:tr>
+            </a:tbl>
+          </a:graphicData>
+        </a:graphic>
+      </p:graphicFrame>
+      <p:sp>
+        <p:nvSpPr>
+          <p:cNvPr id="85" name="Rectangle 84">
+            <a:extLst>
+              <a:ext uri="{FF2B5EF4-FFF2-40B4-BE49-F238E27FC236}">
+                <a16:creationId xmlns:a16="http://schemas.microsoft.com/office/drawing/2014/main" id="{2B52DCFE-C74A-4031-AFE1-D5EA8CE0ABF5}"/>
+              </a:ext>
+            </a:extLst>
+          </p:cNvPr>
+          <p:cNvSpPr/>
+          <p:nvPr/>
+        </p:nvSpPr>
+        <p:spPr>
+          <a:xfrm>
+            <a:off x="918927" y="2646554"/>
+            <a:ext cx="2333943" cy="1612334"/>
+          </a:xfrm>
+          <a:prstGeom prst="rect">
+            <a:avLst/>
+          </a:prstGeom>
+          <a:solidFill>
+            <a:schemeClr val="accent6">
+              <a:lumMod val="75000"/>
+            </a:schemeClr>
+          </a:solidFill>
+          <a:ln>
+            <a:solidFill>
+              <a:schemeClr val="accent6">
+                <a:lumMod val="50000"/>
+              </a:schemeClr>
+            </a:solidFill>
+          </a:ln>
+        </p:spPr>
+        <p:style>
+          <a:lnRef idx="2">
+            <a:schemeClr val="accent1">
+              <a:shade val="50000"/>
+            </a:schemeClr>
+          </a:lnRef>
+          <a:fillRef idx="1">
+            <a:schemeClr val="accent1"/>
+          </a:fillRef>
+          <a:effectRef idx="0">
+            <a:schemeClr val="accent1"/>
+          </a:effectRef>
+          <a:fontRef idx="minor">
+            <a:schemeClr val="lt1"/>
+          </a:fontRef>
+        </p:style>
+        <p:txBody>
+          <a:bodyPr rtlCol="0" anchor="t"/>
+          <a:lstStyle/>
+          <a:p>
+            <a:pPr algn="ctr"/>
+            <a:r>
+              <a:rPr lang="en-CA" sz="1200" b="1" dirty="0">
+                <a:solidFill>
+                  <a:schemeClr val="bg1"/>
+                </a:solidFill>
+              </a:rPr>
+              <a:t>Client App</a:t>
+            </a:r>
+            <a:endParaRPr lang="en-US" sz="1200" b="1" dirty="0">
+              <a:solidFill>
+                <a:schemeClr val="bg1"/>
+              </a:solidFill>
+            </a:endParaRPr>
+          </a:p>
+        </p:txBody>
+      </p:sp>
+      <p:sp>
+        <p:nvSpPr>
+          <p:cNvPr id="99" name="Rectangle 98">
+            <a:extLst>
+              <a:ext uri="{FF2B5EF4-FFF2-40B4-BE49-F238E27FC236}">
+                <a16:creationId xmlns:a16="http://schemas.microsoft.com/office/drawing/2014/main" id="{988AA2B7-5B37-4608-92B4-F55C9AD3CED9}"/>
+              </a:ext>
+            </a:extLst>
+          </p:cNvPr>
+          <p:cNvSpPr/>
+          <p:nvPr/>
+        </p:nvSpPr>
+        <p:spPr>
+          <a:xfrm>
+            <a:off x="980151" y="3086100"/>
+            <a:ext cx="2175288" cy="1067737"/>
+          </a:xfrm>
+          <a:prstGeom prst="rect">
+            <a:avLst/>
+          </a:prstGeom>
+          <a:solidFill>
+            <a:srgbClr val="0070C0"/>
+          </a:solidFill>
+        </p:spPr>
+        <p:style>
+          <a:lnRef idx="2">
+            <a:schemeClr val="accent1">
+              <a:shade val="50000"/>
+            </a:schemeClr>
+          </a:lnRef>
+          <a:fillRef idx="1">
+            <a:schemeClr val="accent1"/>
+          </a:fillRef>
+          <a:effectRef idx="0">
+            <a:schemeClr val="accent1"/>
+          </a:effectRef>
+          <a:fontRef idx="minor">
+            <a:schemeClr val="lt1"/>
+          </a:fontRef>
+        </p:style>
+        <p:txBody>
+          <a:bodyPr rtlCol="0" anchor="t"/>
+          <a:lstStyle/>
+          <a:p>
+            <a:pPr algn="ctr"/>
+            <a:r>
+              <a:rPr lang="en-CA" sz="1200" b="1" dirty="0">
+                <a:solidFill>
+                  <a:schemeClr val="bg1"/>
+                </a:solidFill>
+              </a:rPr>
+              <a:t>DID Resolver Full Service</a:t>
+            </a:r>
+            <a:endParaRPr lang="en-US" sz="1200" b="1" dirty="0">
+              <a:solidFill>
+                <a:schemeClr val="bg1"/>
+              </a:solidFill>
+            </a:endParaRPr>
+          </a:p>
+        </p:txBody>
+      </p:sp>
+      <p:sp>
+        <p:nvSpPr>
+          <p:cNvPr id="86" name="Rectangle 85">
+            <a:extLst>
+              <a:ext uri="{FF2B5EF4-FFF2-40B4-BE49-F238E27FC236}">
+                <a16:creationId xmlns:a16="http://schemas.microsoft.com/office/drawing/2014/main" id="{81FE84DA-8229-42B3-BC11-3E0D1AF2B28D}"/>
+              </a:ext>
+            </a:extLst>
+          </p:cNvPr>
+          <p:cNvSpPr/>
+          <p:nvPr/>
+        </p:nvSpPr>
+        <p:spPr>
+          <a:xfrm>
+            <a:off x="3572912" y="3086100"/>
+            <a:ext cx="2175288" cy="1114934"/>
+          </a:xfrm>
+          <a:prstGeom prst="rect">
+            <a:avLst/>
+          </a:prstGeom>
+          <a:solidFill>
+            <a:srgbClr val="0070C0"/>
+          </a:solidFill>
+        </p:spPr>
+        <p:style>
+          <a:lnRef idx="2">
+            <a:schemeClr val="accent1">
+              <a:shade val="50000"/>
+            </a:schemeClr>
+          </a:lnRef>
+          <a:fillRef idx="1">
+            <a:schemeClr val="accent1"/>
+          </a:fillRef>
+          <a:effectRef idx="0">
+            <a:schemeClr val="accent1"/>
+          </a:effectRef>
+          <a:fontRef idx="minor">
+            <a:schemeClr val="lt1"/>
+          </a:fontRef>
+        </p:style>
+        <p:txBody>
+          <a:bodyPr rtlCol="0" anchor="t"/>
+          <a:lstStyle/>
+          <a:p>
+            <a:pPr algn="ctr"/>
+            <a:r>
+              <a:rPr lang="en-CA" sz="1200" b="1" dirty="0">
+                <a:solidFill>
+                  <a:schemeClr val="bg1"/>
+                </a:solidFill>
+              </a:rPr>
+              <a:t>DID Resolver Full Node</a:t>
+            </a:r>
+            <a:endParaRPr lang="en-US" sz="1200" b="1" dirty="0">
+              <a:solidFill>
+                <a:schemeClr val="bg1"/>
+              </a:solidFill>
+            </a:endParaRPr>
+          </a:p>
+        </p:txBody>
+      </p:sp>
+      <p:sp>
+        <p:nvSpPr>
+          <p:cNvPr id="87" name="TextBox 86">
+            <a:extLst>
+              <a:ext uri="{FF2B5EF4-FFF2-40B4-BE49-F238E27FC236}">
+                <a16:creationId xmlns:a16="http://schemas.microsoft.com/office/drawing/2014/main" id="{6E4B327D-3855-44FE-8CCB-CB44F182C406}"/>
+              </a:ext>
+            </a:extLst>
+          </p:cNvPr>
+          <p:cNvSpPr txBox="1"/>
+          <p:nvPr/>
+        </p:nvSpPr>
+        <p:spPr>
+          <a:xfrm rot="16200000">
+            <a:off x="-1775826" y="2044431"/>
+            <a:ext cx="4131428" cy="461665"/>
+          </a:xfrm>
+          <a:prstGeom prst="rect">
+            <a:avLst/>
+          </a:prstGeom>
+          <a:noFill/>
+        </p:spPr>
+        <p:txBody>
+          <a:bodyPr wrap="square" rtlCol="0">
+            <a:spAutoFit/>
+          </a:bodyPr>
+          <a:lstStyle/>
+          <a:p>
+            <a:pPr algn="ctr"/>
+            <a:r>
+              <a:rPr lang="en-CA" sz="2400" dirty="0"/>
+              <a:t>Verifiable Data Registry (VDR)</a:t>
+            </a:r>
+            <a:endParaRPr lang="en-US" sz="2400" dirty="0"/>
+          </a:p>
+        </p:txBody>
+      </p:sp>
+      <p:sp>
+        <p:nvSpPr>
+          <p:cNvPr id="88" name="TextBox 87">
+            <a:extLst>
+              <a:ext uri="{FF2B5EF4-FFF2-40B4-BE49-F238E27FC236}">
+                <a16:creationId xmlns:a16="http://schemas.microsoft.com/office/drawing/2014/main" id="{61E5A11F-511D-49C3-A64C-7CCC6F04F64E}"/>
+              </a:ext>
+            </a:extLst>
+          </p:cNvPr>
+          <p:cNvSpPr txBox="1"/>
+          <p:nvPr/>
+        </p:nvSpPr>
+        <p:spPr>
+          <a:xfrm rot="16200000">
+            <a:off x="-453393" y="1062918"/>
+            <a:ext cx="2072472" cy="369332"/>
+          </a:xfrm>
+          <a:prstGeom prst="rect">
+            <a:avLst/>
+          </a:prstGeom>
+          <a:noFill/>
+        </p:spPr>
+        <p:txBody>
+          <a:bodyPr wrap="square" rtlCol="0">
+            <a:spAutoFit/>
+          </a:bodyPr>
+          <a:lstStyle/>
+          <a:p>
+            <a:pPr algn="ctr"/>
+            <a:r>
+              <a:rPr lang="en-CA" sz="1800" dirty="0"/>
+              <a:t>Remote</a:t>
+            </a:r>
+            <a:endParaRPr lang="en-US" sz="1800" dirty="0"/>
+          </a:p>
+        </p:txBody>
+      </p:sp>
+      <p:sp>
+        <p:nvSpPr>
+          <p:cNvPr id="89" name="TextBox 88">
+            <a:extLst>
+              <a:ext uri="{FF2B5EF4-FFF2-40B4-BE49-F238E27FC236}">
+                <a16:creationId xmlns:a16="http://schemas.microsoft.com/office/drawing/2014/main" id="{59ED3085-1C61-423D-AB80-D1650ABDCEF5}"/>
+              </a:ext>
+            </a:extLst>
+          </p:cNvPr>
+          <p:cNvSpPr txBox="1"/>
+          <p:nvPr/>
+        </p:nvSpPr>
+        <p:spPr>
+          <a:xfrm rot="16200000">
+            <a:off x="-413200" y="3122356"/>
+            <a:ext cx="1992086" cy="369332"/>
+          </a:xfrm>
+          <a:prstGeom prst="rect">
+            <a:avLst/>
+          </a:prstGeom>
+          <a:noFill/>
+        </p:spPr>
+        <p:txBody>
+          <a:bodyPr wrap="square" rtlCol="0">
+            <a:spAutoFit/>
+          </a:bodyPr>
+          <a:lstStyle/>
+          <a:p>
+            <a:pPr algn="ctr"/>
+            <a:r>
+              <a:rPr lang="en-CA" sz="1800" dirty="0"/>
+              <a:t>Local</a:t>
+            </a:r>
+            <a:endParaRPr lang="en-US" sz="1800" dirty="0"/>
+          </a:p>
+        </p:txBody>
+      </p:sp>
+      <p:sp>
+        <p:nvSpPr>
+          <p:cNvPr id="90" name="TextBox 89">
+            <a:extLst>
+              <a:ext uri="{FF2B5EF4-FFF2-40B4-BE49-F238E27FC236}">
+                <a16:creationId xmlns:a16="http://schemas.microsoft.com/office/drawing/2014/main" id="{BF7F81C1-F682-487D-8677-C27D8396A486}"/>
+              </a:ext>
+            </a:extLst>
+          </p:cNvPr>
+          <p:cNvSpPr txBox="1"/>
+          <p:nvPr/>
+        </p:nvSpPr>
+        <p:spPr>
+          <a:xfrm>
+            <a:off x="3252870" y="4379871"/>
+            <a:ext cx="2495329" cy="369332"/>
+          </a:xfrm>
+          <a:prstGeom prst="rect">
+            <a:avLst/>
+          </a:prstGeom>
+          <a:noFill/>
+        </p:spPr>
+        <p:txBody>
+          <a:bodyPr wrap="square" rtlCol="0">
+            <a:spAutoFit/>
+          </a:bodyPr>
+          <a:lstStyle/>
+          <a:p>
+            <a:pPr algn="ctr"/>
+            <a:r>
+              <a:rPr lang="en-CA" sz="1800" dirty="0"/>
+              <a:t>Remote</a:t>
+            </a:r>
+            <a:endParaRPr lang="en-US" sz="1800" dirty="0"/>
+          </a:p>
+        </p:txBody>
+      </p:sp>
+      <p:sp>
+        <p:nvSpPr>
+          <p:cNvPr id="91" name="TextBox 90">
+            <a:extLst>
+              <a:ext uri="{FF2B5EF4-FFF2-40B4-BE49-F238E27FC236}">
+                <a16:creationId xmlns:a16="http://schemas.microsoft.com/office/drawing/2014/main" id="{D8A1DCA9-7E9A-4FEF-B6D4-1A7E85A591E7}"/>
+              </a:ext>
+            </a:extLst>
+          </p:cNvPr>
+          <p:cNvSpPr txBox="1"/>
+          <p:nvPr/>
+        </p:nvSpPr>
+        <p:spPr>
+          <a:xfrm>
+            <a:off x="767509" y="4391341"/>
+            <a:ext cx="2481330" cy="369332"/>
+          </a:xfrm>
+          <a:prstGeom prst="rect">
+            <a:avLst/>
+          </a:prstGeom>
+          <a:noFill/>
+        </p:spPr>
+        <p:txBody>
+          <a:bodyPr wrap="square" rtlCol="0">
+            <a:spAutoFit/>
+          </a:bodyPr>
+          <a:lstStyle/>
+          <a:p>
+            <a:pPr algn="ctr"/>
+            <a:r>
+              <a:rPr lang="en-CA" sz="1800" dirty="0"/>
+              <a:t>Local</a:t>
+            </a:r>
+            <a:endParaRPr lang="en-US" sz="1800" dirty="0"/>
+          </a:p>
+        </p:txBody>
+      </p:sp>
+      <p:sp>
+        <p:nvSpPr>
+          <p:cNvPr id="92" name="TextBox 91">
+            <a:extLst>
+              <a:ext uri="{FF2B5EF4-FFF2-40B4-BE49-F238E27FC236}">
+                <a16:creationId xmlns:a16="http://schemas.microsoft.com/office/drawing/2014/main" id="{F6A25177-9E70-48DD-815A-BD4739F31FB3}"/>
+              </a:ext>
+            </a:extLst>
+          </p:cNvPr>
+          <p:cNvSpPr txBox="1"/>
+          <p:nvPr/>
+        </p:nvSpPr>
+        <p:spPr>
+          <a:xfrm>
+            <a:off x="769948" y="4685520"/>
+            <a:ext cx="5222748" cy="461665"/>
+          </a:xfrm>
+          <a:prstGeom prst="rect">
+            <a:avLst/>
+          </a:prstGeom>
+          <a:noFill/>
+        </p:spPr>
+        <p:txBody>
+          <a:bodyPr wrap="square" rtlCol="0">
+            <a:spAutoFit/>
+          </a:bodyPr>
+          <a:lstStyle/>
+          <a:p>
+            <a:pPr algn="ctr"/>
+            <a:r>
+              <a:rPr lang="en-CA" sz="2400" dirty="0"/>
+              <a:t>DID Resolver</a:t>
+            </a:r>
+            <a:endParaRPr lang="en-US" sz="2400" dirty="0"/>
+          </a:p>
+        </p:txBody>
+      </p:sp>
+      <p:sp>
+        <p:nvSpPr>
+          <p:cNvPr id="93" name="Rectangle 92">
+            <a:extLst>
+              <a:ext uri="{FF2B5EF4-FFF2-40B4-BE49-F238E27FC236}">
+                <a16:creationId xmlns:a16="http://schemas.microsoft.com/office/drawing/2014/main" id="{89DCE182-570D-4B8B-9E99-3058D055C70C}"/>
+              </a:ext>
+            </a:extLst>
+          </p:cNvPr>
+          <p:cNvSpPr/>
+          <p:nvPr/>
+        </p:nvSpPr>
+        <p:spPr>
+          <a:xfrm>
+            <a:off x="1082409" y="3397264"/>
+            <a:ext cx="1973449" cy="259199"/>
+          </a:xfrm>
+          <a:prstGeom prst="rect">
+            <a:avLst/>
+          </a:prstGeom>
+          <a:solidFill>
+            <a:schemeClr val="accent5">
+              <a:lumMod val="50000"/>
+            </a:schemeClr>
+          </a:solidFill>
+          <a:ln>
+            <a:solidFill>
+              <a:schemeClr val="accent5">
+                <a:lumMod val="75000"/>
+              </a:schemeClr>
+            </a:solidFill>
+          </a:ln>
+        </p:spPr>
+        <p:style>
+          <a:lnRef idx="2">
+            <a:schemeClr val="accent1">
+              <a:shade val="50000"/>
+            </a:schemeClr>
+          </a:lnRef>
+          <a:fillRef idx="1">
+            <a:schemeClr val="accent1"/>
+          </a:fillRef>
+          <a:effectRef idx="0">
+            <a:schemeClr val="accent1"/>
+          </a:effectRef>
+          <a:fontRef idx="minor">
+            <a:schemeClr val="lt1"/>
+          </a:fontRef>
+        </p:style>
+        <p:txBody>
+          <a:bodyPr rtlCol="0" anchor="ctr"/>
+          <a:lstStyle/>
+          <a:p>
+            <a:pPr algn="ctr"/>
+            <a:r>
+              <a:rPr lang="en-CA" sz="1200" b="1" dirty="0">
+                <a:solidFill>
+                  <a:schemeClr val="bg1"/>
+                </a:solidFill>
+              </a:rPr>
+              <a:t>VDR Service</a:t>
+            </a:r>
+            <a:endParaRPr lang="en-US" sz="1200" b="1" dirty="0">
+              <a:solidFill>
+                <a:schemeClr val="bg1"/>
+              </a:solidFill>
+            </a:endParaRPr>
+          </a:p>
+        </p:txBody>
+      </p:sp>
+      <p:sp>
+        <p:nvSpPr>
+          <p:cNvPr id="94" name="TextBox 93">
+            <a:extLst>
+              <a:ext uri="{FF2B5EF4-FFF2-40B4-BE49-F238E27FC236}">
+                <a16:creationId xmlns:a16="http://schemas.microsoft.com/office/drawing/2014/main" id="{2C0CB250-920B-4641-8857-999DC7781992}"/>
+              </a:ext>
+            </a:extLst>
+          </p:cNvPr>
+          <p:cNvSpPr txBox="1"/>
+          <p:nvPr/>
+        </p:nvSpPr>
+        <p:spPr>
+          <a:xfrm>
+            <a:off x="1081071" y="3709455"/>
+            <a:ext cx="1973449" cy="276999"/>
+          </a:xfrm>
+          <a:prstGeom prst="rect">
+            <a:avLst/>
+          </a:prstGeom>
+          <a:solidFill>
+            <a:srgbClr val="002060"/>
+          </a:solidFill>
+          <a:ln>
+            <a:solidFill>
+              <a:schemeClr val="bg1">
+                <a:lumMod val="50000"/>
+              </a:schemeClr>
+            </a:solidFill>
+          </a:ln>
+        </p:spPr>
+        <p:txBody>
+          <a:bodyPr wrap="square" rtlCol="0">
+            <a:spAutoFit/>
+          </a:bodyPr>
+          <a:lstStyle/>
+          <a:p>
+            <a:pPr algn="ctr"/>
+            <a:r>
+              <a:rPr lang="en-CA" sz="1200" b="1" dirty="0">
+                <a:solidFill>
+                  <a:schemeClr val="bg1"/>
+                </a:solidFill>
+              </a:rPr>
+              <a:t>VDR State Replica</a:t>
+            </a:r>
+            <a:endParaRPr lang="en-US" sz="1200" b="1" dirty="0">
+              <a:solidFill>
+                <a:schemeClr val="bg1"/>
+              </a:solidFill>
+            </a:endParaRPr>
+          </a:p>
+        </p:txBody>
+      </p:sp>
+      <p:sp>
+        <p:nvSpPr>
+          <p:cNvPr id="95" name="Rectangle 94">
+            <a:extLst>
+              <a:ext uri="{FF2B5EF4-FFF2-40B4-BE49-F238E27FC236}">
+                <a16:creationId xmlns:a16="http://schemas.microsoft.com/office/drawing/2014/main" id="{FCF07A0F-2489-47E6-BD8D-610384CAF5C8}"/>
+              </a:ext>
+            </a:extLst>
+          </p:cNvPr>
+          <p:cNvSpPr/>
+          <p:nvPr/>
+        </p:nvSpPr>
+        <p:spPr>
+          <a:xfrm>
+            <a:off x="3676857" y="3404883"/>
+            <a:ext cx="1973449" cy="259199"/>
+          </a:xfrm>
+          <a:prstGeom prst="rect">
+            <a:avLst/>
+          </a:prstGeom>
+          <a:solidFill>
+            <a:schemeClr val="accent5">
+              <a:lumMod val="50000"/>
+            </a:schemeClr>
+          </a:solidFill>
+          <a:ln>
+            <a:solidFill>
+              <a:schemeClr val="accent5">
+                <a:lumMod val="75000"/>
+              </a:schemeClr>
+            </a:solidFill>
+          </a:ln>
+        </p:spPr>
+        <p:style>
+          <a:lnRef idx="2">
+            <a:schemeClr val="accent1">
+              <a:shade val="50000"/>
+            </a:schemeClr>
+          </a:lnRef>
+          <a:fillRef idx="1">
+            <a:schemeClr val="accent1"/>
+          </a:fillRef>
+          <a:effectRef idx="0">
+            <a:schemeClr val="accent1"/>
+          </a:effectRef>
+          <a:fontRef idx="minor">
+            <a:schemeClr val="lt1"/>
+          </a:fontRef>
+        </p:style>
+        <p:txBody>
+          <a:bodyPr rtlCol="0" anchor="ctr"/>
+          <a:lstStyle/>
+          <a:p>
+            <a:pPr algn="ctr"/>
+            <a:r>
+              <a:rPr lang="en-CA" sz="1200" b="1" dirty="0">
+                <a:solidFill>
+                  <a:schemeClr val="bg1"/>
+                </a:solidFill>
+              </a:rPr>
+              <a:t>VDR Service</a:t>
+            </a:r>
+            <a:endParaRPr lang="en-US" sz="1200" b="1" dirty="0">
+              <a:solidFill>
+                <a:schemeClr val="bg1"/>
+              </a:solidFill>
+            </a:endParaRPr>
+          </a:p>
+        </p:txBody>
+      </p:sp>
+      <p:sp>
+        <p:nvSpPr>
+          <p:cNvPr id="96" name="TextBox 95">
+            <a:extLst>
+              <a:ext uri="{FF2B5EF4-FFF2-40B4-BE49-F238E27FC236}">
+                <a16:creationId xmlns:a16="http://schemas.microsoft.com/office/drawing/2014/main" id="{FDD67E2D-097C-46A7-83F6-81137A6446EA}"/>
+              </a:ext>
+            </a:extLst>
+          </p:cNvPr>
+          <p:cNvSpPr txBox="1"/>
+          <p:nvPr/>
+        </p:nvSpPr>
+        <p:spPr>
+          <a:xfrm>
+            <a:off x="3675519" y="3717074"/>
+            <a:ext cx="1973449" cy="276999"/>
+          </a:xfrm>
+          <a:prstGeom prst="rect">
+            <a:avLst/>
+          </a:prstGeom>
+          <a:solidFill>
+            <a:srgbClr val="002060"/>
+          </a:solidFill>
+          <a:ln>
+            <a:solidFill>
+              <a:schemeClr val="bg1">
+                <a:lumMod val="50000"/>
+              </a:schemeClr>
+            </a:solidFill>
+          </a:ln>
+        </p:spPr>
+        <p:txBody>
+          <a:bodyPr wrap="square" rtlCol="0">
+            <a:spAutoFit/>
+          </a:bodyPr>
+          <a:lstStyle/>
+          <a:p>
+            <a:pPr algn="ctr"/>
+            <a:r>
+              <a:rPr lang="en-CA" sz="1200" b="1" dirty="0">
+                <a:solidFill>
+                  <a:schemeClr val="bg1"/>
+                </a:solidFill>
+              </a:rPr>
+              <a:t>VDR State Replica</a:t>
+            </a:r>
+            <a:endParaRPr lang="en-US" sz="1200" b="1" dirty="0">
+              <a:solidFill>
+                <a:schemeClr val="bg1"/>
+              </a:solidFill>
+            </a:endParaRPr>
+          </a:p>
+        </p:txBody>
+      </p:sp>
+      <p:sp>
+        <p:nvSpPr>
+          <p:cNvPr id="97" name="Rectangle 96">
+            <a:extLst>
+              <a:ext uri="{FF2B5EF4-FFF2-40B4-BE49-F238E27FC236}">
+                <a16:creationId xmlns:a16="http://schemas.microsoft.com/office/drawing/2014/main" id="{960A2279-C7B7-4C7B-9DFE-ABDEF5516915}"/>
+              </a:ext>
+            </a:extLst>
+          </p:cNvPr>
+          <p:cNvSpPr/>
+          <p:nvPr/>
+        </p:nvSpPr>
+        <p:spPr>
+          <a:xfrm>
+            <a:off x="3493583" y="2636334"/>
+            <a:ext cx="2333943" cy="259199"/>
+          </a:xfrm>
+          <a:prstGeom prst="rect">
+            <a:avLst/>
+          </a:prstGeom>
+          <a:solidFill>
+            <a:schemeClr val="accent6">
+              <a:lumMod val="75000"/>
+            </a:schemeClr>
+          </a:solidFill>
+          <a:ln>
+            <a:solidFill>
+              <a:schemeClr val="accent6">
+                <a:lumMod val="50000"/>
+              </a:schemeClr>
+            </a:solidFill>
+          </a:ln>
+        </p:spPr>
+        <p:style>
+          <a:lnRef idx="2">
+            <a:schemeClr val="accent1">
+              <a:shade val="50000"/>
+            </a:schemeClr>
+          </a:lnRef>
+          <a:fillRef idx="1">
+            <a:schemeClr val="accent1"/>
+          </a:fillRef>
+          <a:effectRef idx="0">
+            <a:schemeClr val="accent1"/>
+          </a:effectRef>
+          <a:fontRef idx="minor">
+            <a:schemeClr val="lt1"/>
+          </a:fontRef>
+        </p:style>
+        <p:txBody>
+          <a:bodyPr rtlCol="0" anchor="ctr"/>
+          <a:lstStyle/>
+          <a:p>
+            <a:pPr algn="ctr"/>
+            <a:r>
+              <a:rPr lang="en-CA" sz="1200" b="1" dirty="0">
+                <a:solidFill>
+                  <a:schemeClr val="bg1"/>
+                </a:solidFill>
+              </a:rPr>
+              <a:t>Client App</a:t>
+            </a:r>
+            <a:endParaRPr lang="en-US" sz="1200" b="1" dirty="0">
+              <a:solidFill>
+                <a:schemeClr val="bg1"/>
+              </a:solidFill>
+            </a:endParaRPr>
+          </a:p>
+        </p:txBody>
+      </p:sp>
+      <p:sp>
+        <p:nvSpPr>
+          <p:cNvPr id="98" name="Rectangle 97">
+            <a:extLst>
+              <a:ext uri="{FF2B5EF4-FFF2-40B4-BE49-F238E27FC236}">
+                <a16:creationId xmlns:a16="http://schemas.microsoft.com/office/drawing/2014/main" id="{575F2F3A-7990-4DA4-9D14-0ECB4B1374C7}"/>
+              </a:ext>
+            </a:extLst>
+          </p:cNvPr>
+          <p:cNvSpPr/>
+          <p:nvPr/>
+        </p:nvSpPr>
+        <p:spPr>
+          <a:xfrm>
+            <a:off x="3496611" y="546540"/>
+            <a:ext cx="2333943" cy="259199"/>
+          </a:xfrm>
+          <a:prstGeom prst="rect">
+            <a:avLst/>
+          </a:prstGeom>
+          <a:solidFill>
+            <a:schemeClr val="accent6">
+              <a:lumMod val="75000"/>
+            </a:schemeClr>
+          </a:solidFill>
+          <a:ln>
+            <a:solidFill>
+              <a:schemeClr val="accent6">
+                <a:lumMod val="50000"/>
+              </a:schemeClr>
+            </a:solidFill>
+          </a:ln>
+        </p:spPr>
+        <p:style>
+          <a:lnRef idx="2">
+            <a:schemeClr val="accent1">
+              <a:shade val="50000"/>
+            </a:schemeClr>
+          </a:lnRef>
+          <a:fillRef idx="1">
+            <a:schemeClr val="accent1"/>
+          </a:fillRef>
+          <a:effectRef idx="0">
+            <a:schemeClr val="accent1"/>
+          </a:effectRef>
+          <a:fontRef idx="minor">
+            <a:schemeClr val="lt1"/>
+          </a:fontRef>
+        </p:style>
+        <p:txBody>
+          <a:bodyPr rtlCol="0" anchor="ctr"/>
+          <a:lstStyle/>
+          <a:p>
+            <a:pPr algn="ctr"/>
+            <a:r>
+              <a:rPr lang="en-CA" sz="1200" b="1" dirty="0">
+                <a:solidFill>
+                  <a:schemeClr val="bg1"/>
+                </a:solidFill>
+              </a:rPr>
+              <a:t>Client App</a:t>
+            </a:r>
+            <a:endParaRPr lang="en-US" sz="1200" b="1" dirty="0">
+              <a:solidFill>
+                <a:schemeClr val="bg1"/>
+              </a:solidFill>
+            </a:endParaRPr>
+          </a:p>
+        </p:txBody>
+      </p:sp>
+      <p:sp>
+        <p:nvSpPr>
+          <p:cNvPr id="100" name="Rectangle 99">
+            <a:extLst>
+              <a:ext uri="{FF2B5EF4-FFF2-40B4-BE49-F238E27FC236}">
+                <a16:creationId xmlns:a16="http://schemas.microsoft.com/office/drawing/2014/main" id="{E32BF52E-3CF1-4A8F-A52E-62975B85BFC5}"/>
+              </a:ext>
+            </a:extLst>
+          </p:cNvPr>
+          <p:cNvSpPr/>
+          <p:nvPr/>
+        </p:nvSpPr>
+        <p:spPr>
+          <a:xfrm>
+            <a:off x="910066" y="1457127"/>
+            <a:ext cx="2333943" cy="732084"/>
+          </a:xfrm>
+          <a:prstGeom prst="rect">
+            <a:avLst/>
+          </a:prstGeom>
+          <a:solidFill>
+            <a:schemeClr val="accent5">
+              <a:lumMod val="50000"/>
+            </a:schemeClr>
+          </a:solidFill>
+          <a:ln>
+            <a:solidFill>
+              <a:schemeClr val="accent5">
+                <a:lumMod val="75000"/>
+              </a:schemeClr>
+            </a:solidFill>
+          </a:ln>
+        </p:spPr>
+        <p:style>
+          <a:lnRef idx="2">
+            <a:schemeClr val="accent1">
+              <a:shade val="50000"/>
+            </a:schemeClr>
+          </a:lnRef>
+          <a:fillRef idx="1">
+            <a:schemeClr val="accent1"/>
+          </a:fillRef>
+          <a:effectRef idx="0">
+            <a:schemeClr val="accent1"/>
+          </a:effectRef>
+          <a:fontRef idx="minor">
+            <a:schemeClr val="lt1"/>
+          </a:fontRef>
+        </p:style>
+        <p:txBody>
+          <a:bodyPr rtlCol="0" anchor="t"/>
+          <a:lstStyle/>
+          <a:p>
+            <a:pPr algn="ctr"/>
+            <a:r>
+              <a:rPr lang="en-CA" sz="1200" b="1" dirty="0">
+                <a:solidFill>
+                  <a:schemeClr val="bg1"/>
+                </a:solidFill>
+              </a:rPr>
+              <a:t>VDR Full Node</a:t>
+            </a:r>
+            <a:endParaRPr lang="en-US" sz="1200" b="1" dirty="0">
+              <a:solidFill>
+                <a:schemeClr val="bg1"/>
+              </a:solidFill>
+            </a:endParaRPr>
+          </a:p>
+        </p:txBody>
+      </p:sp>
+      <p:sp>
+        <p:nvSpPr>
+          <p:cNvPr id="101" name="TextBox 100">
+            <a:extLst>
+              <a:ext uri="{FF2B5EF4-FFF2-40B4-BE49-F238E27FC236}">
+                <a16:creationId xmlns:a16="http://schemas.microsoft.com/office/drawing/2014/main" id="{1518D1DE-BE0E-4ADF-9C51-C87A047BBEBB}"/>
+              </a:ext>
+            </a:extLst>
+          </p:cNvPr>
+          <p:cNvSpPr txBox="1"/>
+          <p:nvPr/>
+        </p:nvSpPr>
+        <p:spPr>
+          <a:xfrm>
+            <a:off x="1072210" y="1769318"/>
+            <a:ext cx="1973449" cy="276999"/>
+          </a:xfrm>
+          <a:prstGeom prst="rect">
+            <a:avLst/>
+          </a:prstGeom>
+          <a:solidFill>
+            <a:srgbClr val="002060"/>
+          </a:solidFill>
+          <a:ln>
+            <a:solidFill>
+              <a:schemeClr val="bg1">
+                <a:lumMod val="50000"/>
+              </a:schemeClr>
+            </a:solidFill>
+          </a:ln>
+        </p:spPr>
+        <p:txBody>
+          <a:bodyPr wrap="square" rtlCol="0">
+            <a:spAutoFit/>
+          </a:bodyPr>
+          <a:lstStyle/>
+          <a:p>
+            <a:pPr algn="ctr"/>
+            <a:r>
+              <a:rPr lang="en-CA" sz="1200" b="1" dirty="0">
+                <a:solidFill>
+                  <a:schemeClr val="bg1"/>
+                </a:solidFill>
+              </a:rPr>
+              <a:t>VDR State Replica</a:t>
+            </a:r>
+            <a:endParaRPr lang="en-US" sz="1200" b="1" dirty="0">
+              <a:solidFill>
+                <a:schemeClr val="bg1"/>
+              </a:solidFill>
+            </a:endParaRPr>
+          </a:p>
+        </p:txBody>
+      </p:sp>
+      <p:grpSp>
+        <p:nvGrpSpPr>
+          <p:cNvPr id="102" name="Group 101">
+            <a:extLst>
+              <a:ext uri="{FF2B5EF4-FFF2-40B4-BE49-F238E27FC236}">
+                <a16:creationId xmlns:a16="http://schemas.microsoft.com/office/drawing/2014/main" id="{547DF4B0-67DC-4862-9DBA-26ECC18F8E49}"/>
+              </a:ext>
+            </a:extLst>
+          </p:cNvPr>
+          <p:cNvGrpSpPr/>
+          <p:nvPr/>
+        </p:nvGrpSpPr>
+        <p:grpSpPr>
+          <a:xfrm>
+            <a:off x="910066" y="546541"/>
+            <a:ext cx="2333943" cy="732084"/>
+            <a:chOff x="1916775" y="1542347"/>
+            <a:chExt cx="2333943" cy="732084"/>
+          </a:xfrm>
+        </p:grpSpPr>
+        <p:sp>
+          <p:nvSpPr>
+            <p:cNvPr id="103" name="Rectangle 102">
+              <a:extLst>
+                <a:ext uri="{FF2B5EF4-FFF2-40B4-BE49-F238E27FC236}">
+                  <a16:creationId xmlns:a16="http://schemas.microsoft.com/office/drawing/2014/main" id="{177247AA-D128-464A-81F8-17B6BB3D8F94}"/>
+                </a:ext>
+              </a:extLst>
+            </p:cNvPr>
+            <p:cNvSpPr/>
+            <p:nvPr/>
+          </p:nvSpPr>
+          <p:spPr>
+            <a:xfrm>
+              <a:off x="1916775" y="1542347"/>
+              <a:ext cx="2333943" cy="732084"/>
+            </a:xfrm>
+            <a:prstGeom prst="rect">
+              <a:avLst/>
+            </a:prstGeom>
+            <a:solidFill>
+              <a:schemeClr val="accent6">
+                <a:lumMod val="75000"/>
+              </a:schemeClr>
+            </a:solidFill>
+            <a:ln>
+              <a:solidFill>
+                <a:schemeClr val="accent6">
+                  <a:lumMod val="50000"/>
+                </a:schemeClr>
+              </a:solidFill>
+            </a:ln>
+          </p:spPr>
+          <p:style>
+            <a:lnRef idx="2">
+              <a:schemeClr val="accent1">
+                <a:shade val="50000"/>
+              </a:schemeClr>
+            </a:lnRef>
+            <a:fillRef idx="1">
+              <a:schemeClr val="accent1"/>
+            </a:fillRef>
+            <a:effectRef idx="0">
+              <a:schemeClr val="accent1"/>
+            </a:effectRef>
+            <a:fontRef idx="minor">
+              <a:schemeClr val="lt1"/>
+            </a:fontRef>
+          </p:style>
+          <p:txBody>
+            <a:bodyPr rtlCol="0" anchor="t"/>
+            <a:lstStyle/>
+            <a:p>
+              <a:pPr algn="ctr"/>
+              <a:r>
+                <a:rPr lang="en-CA" sz="1200" b="1" dirty="0">
+                  <a:solidFill>
+                    <a:schemeClr val="bg1"/>
+                  </a:solidFill>
+                </a:rPr>
+                <a:t>Client App</a:t>
+              </a:r>
+              <a:endParaRPr lang="en-US" sz="1200" b="1" dirty="0">
+                <a:solidFill>
+                  <a:schemeClr val="bg1"/>
+                </a:solidFill>
+              </a:endParaRPr>
+            </a:p>
+          </p:txBody>
+        </p:sp>
+        <p:sp>
+          <p:nvSpPr>
+            <p:cNvPr id="104" name="Rectangle 103">
+              <a:extLst>
+                <a:ext uri="{FF2B5EF4-FFF2-40B4-BE49-F238E27FC236}">
+                  <a16:creationId xmlns:a16="http://schemas.microsoft.com/office/drawing/2014/main" id="{BFC4B37F-F334-48DA-8E75-20BEAB63C0A3}"/>
+                </a:ext>
+              </a:extLst>
+            </p:cNvPr>
+            <p:cNvSpPr/>
+            <p:nvPr/>
+          </p:nvSpPr>
+          <p:spPr>
+            <a:xfrm>
+              <a:off x="2016172" y="1862506"/>
+              <a:ext cx="2138355" cy="331228"/>
+            </a:xfrm>
+            <a:prstGeom prst="rect">
+              <a:avLst/>
+            </a:prstGeom>
+            <a:solidFill>
+              <a:srgbClr val="0070C0"/>
+            </a:solidFill>
+          </p:spPr>
+          <p:style>
+            <a:lnRef idx="2">
+              <a:schemeClr val="accent1">
+                <a:shade val="50000"/>
+              </a:schemeClr>
+            </a:lnRef>
+            <a:fillRef idx="1">
+              <a:schemeClr val="accent1"/>
+            </a:fillRef>
+            <a:effectRef idx="0">
+              <a:schemeClr val="accent1"/>
+            </a:effectRef>
+            <a:fontRef idx="minor">
+              <a:schemeClr val="lt1"/>
+            </a:fontRef>
+          </p:style>
+          <p:txBody>
+            <a:bodyPr rtlCol="0" anchor="ctr"/>
+            <a:lstStyle/>
+            <a:p>
+              <a:pPr algn="ctr"/>
+              <a:r>
+                <a:rPr lang="en-CA" sz="1100" b="1" dirty="0">
+                  <a:solidFill>
+                    <a:schemeClr val="bg1"/>
+                  </a:solidFill>
+                </a:rPr>
+                <a:t>DID Resolver Lightweight Service</a:t>
+              </a:r>
+              <a:endParaRPr lang="en-US" sz="1100" b="1" dirty="0">
+                <a:solidFill>
+                  <a:schemeClr val="bg1"/>
+                </a:solidFill>
+              </a:endParaRPr>
+            </a:p>
+          </p:txBody>
+        </p:sp>
+      </p:grpSp>
+      <p:grpSp>
+        <p:nvGrpSpPr>
+          <p:cNvPr id="105" name="Group 104">
+            <a:extLst>
+              <a:ext uri="{FF2B5EF4-FFF2-40B4-BE49-F238E27FC236}">
+                <a16:creationId xmlns:a16="http://schemas.microsoft.com/office/drawing/2014/main" id="{302367AF-D9AE-4B7A-A77D-43F8346FE31D}"/>
+              </a:ext>
+            </a:extLst>
+          </p:cNvPr>
+          <p:cNvGrpSpPr/>
+          <p:nvPr/>
+        </p:nvGrpSpPr>
+        <p:grpSpPr>
+          <a:xfrm>
+            <a:off x="3493584" y="1457127"/>
+            <a:ext cx="2333943" cy="732084"/>
+            <a:chOff x="1916775" y="2513893"/>
+            <a:chExt cx="2333943" cy="732084"/>
+          </a:xfrm>
+        </p:grpSpPr>
+        <p:sp>
+          <p:nvSpPr>
+            <p:cNvPr id="106" name="Rectangle 105">
+              <a:extLst>
+                <a:ext uri="{FF2B5EF4-FFF2-40B4-BE49-F238E27FC236}">
+                  <a16:creationId xmlns:a16="http://schemas.microsoft.com/office/drawing/2014/main" id="{909D6D5C-6A13-4DAC-A222-6F5FEB080AD8}"/>
+                </a:ext>
+              </a:extLst>
+            </p:cNvPr>
+            <p:cNvSpPr/>
+            <p:nvPr/>
+          </p:nvSpPr>
+          <p:spPr>
+            <a:xfrm>
+              <a:off x="1916775" y="2513893"/>
+              <a:ext cx="2333943" cy="732084"/>
+            </a:xfrm>
+            <a:prstGeom prst="rect">
+              <a:avLst/>
+            </a:prstGeom>
+            <a:solidFill>
+              <a:schemeClr val="accent5">
+                <a:lumMod val="50000"/>
+              </a:schemeClr>
+            </a:solidFill>
+            <a:ln>
+              <a:solidFill>
+                <a:schemeClr val="accent5">
+                  <a:lumMod val="75000"/>
+                </a:schemeClr>
+              </a:solidFill>
+            </a:ln>
+          </p:spPr>
+          <p:style>
+            <a:lnRef idx="2">
+              <a:schemeClr val="accent1">
+                <a:shade val="50000"/>
+              </a:schemeClr>
+            </a:lnRef>
+            <a:fillRef idx="1">
+              <a:schemeClr val="accent1"/>
+            </a:fillRef>
+            <a:effectRef idx="0">
+              <a:schemeClr val="accent1"/>
+            </a:effectRef>
+            <a:fontRef idx="minor">
+              <a:schemeClr val="lt1"/>
+            </a:fontRef>
+          </p:style>
+          <p:txBody>
+            <a:bodyPr rtlCol="0" anchor="t"/>
+            <a:lstStyle/>
+            <a:p>
+              <a:pPr algn="ctr"/>
+              <a:r>
+                <a:rPr lang="en-CA" sz="1200" b="1" dirty="0">
+                  <a:solidFill>
+                    <a:schemeClr val="bg1"/>
+                  </a:solidFill>
+                </a:rPr>
+                <a:t>VDR Full Node</a:t>
+              </a:r>
+              <a:endParaRPr lang="en-US" sz="1200" b="1" dirty="0">
+                <a:solidFill>
+                  <a:schemeClr val="bg1"/>
+                </a:solidFill>
+              </a:endParaRPr>
+            </a:p>
+          </p:txBody>
+        </p:sp>
+        <p:sp>
+          <p:nvSpPr>
+            <p:cNvPr id="107" name="TextBox 106">
+              <a:extLst>
+                <a:ext uri="{FF2B5EF4-FFF2-40B4-BE49-F238E27FC236}">
+                  <a16:creationId xmlns:a16="http://schemas.microsoft.com/office/drawing/2014/main" id="{A3A6ED8C-363B-4178-AEA3-BB9DAAFBE1C9}"/>
+                </a:ext>
+              </a:extLst>
+            </p:cNvPr>
+            <p:cNvSpPr txBox="1"/>
+            <p:nvPr/>
+          </p:nvSpPr>
+          <p:spPr>
+            <a:xfrm>
+              <a:off x="2078919" y="2826084"/>
+              <a:ext cx="1973449" cy="276999"/>
+            </a:xfrm>
+            <a:prstGeom prst="rect">
+              <a:avLst/>
+            </a:prstGeom>
+            <a:solidFill>
+              <a:srgbClr val="002060"/>
+            </a:solidFill>
+            <a:ln>
+              <a:solidFill>
+                <a:schemeClr val="bg1">
+                  <a:lumMod val="50000"/>
+                </a:schemeClr>
+              </a:solidFill>
+            </a:ln>
+          </p:spPr>
+          <p:txBody>
+            <a:bodyPr wrap="square" rtlCol="0">
+              <a:spAutoFit/>
+            </a:bodyPr>
+            <a:lstStyle/>
+            <a:p>
+              <a:pPr algn="ctr"/>
+              <a:r>
+                <a:rPr lang="en-CA" sz="1200" b="1" dirty="0">
+                  <a:solidFill>
+                    <a:schemeClr val="bg1"/>
+                  </a:solidFill>
+                </a:rPr>
+                <a:t>VDR State Replica</a:t>
+              </a:r>
+              <a:endParaRPr lang="en-US" sz="1200" b="1" dirty="0">
+                <a:solidFill>
+                  <a:schemeClr val="bg1"/>
+                </a:solidFill>
+              </a:endParaRPr>
+            </a:p>
+          </p:txBody>
+        </p:sp>
+      </p:grpSp>
+      <p:sp>
+        <p:nvSpPr>
+          <p:cNvPr id="108" name="Rectangle 107">
+            <a:extLst>
+              <a:ext uri="{FF2B5EF4-FFF2-40B4-BE49-F238E27FC236}">
+                <a16:creationId xmlns:a16="http://schemas.microsoft.com/office/drawing/2014/main" id="{20157FD3-1585-49D5-B5C3-014CBECC3278}"/>
+              </a:ext>
+            </a:extLst>
+          </p:cNvPr>
+          <p:cNvSpPr/>
+          <p:nvPr/>
+        </p:nvSpPr>
+        <p:spPr>
+          <a:xfrm>
+            <a:off x="3493583" y="952500"/>
+            <a:ext cx="2333943" cy="326611"/>
+          </a:xfrm>
+          <a:prstGeom prst="rect">
+            <a:avLst/>
+          </a:prstGeom>
+          <a:solidFill>
+            <a:srgbClr val="0070C0"/>
+          </a:solidFill>
+        </p:spPr>
+        <p:style>
+          <a:lnRef idx="2">
+            <a:schemeClr val="accent1">
+              <a:shade val="50000"/>
+            </a:schemeClr>
+          </a:lnRef>
+          <a:fillRef idx="1">
+            <a:schemeClr val="accent1"/>
+          </a:fillRef>
+          <a:effectRef idx="0">
+            <a:schemeClr val="accent1"/>
+          </a:effectRef>
+          <a:fontRef idx="minor">
+            <a:schemeClr val="lt1"/>
+          </a:fontRef>
+        </p:style>
+        <p:txBody>
+          <a:bodyPr rtlCol="0" anchor="t"/>
+          <a:lstStyle/>
+          <a:p>
+            <a:pPr algn="ctr"/>
+            <a:r>
+              <a:rPr lang="en-CA" sz="1200" b="1" dirty="0">
+                <a:solidFill>
+                  <a:schemeClr val="bg1"/>
+                </a:solidFill>
+              </a:rPr>
+              <a:t>DID Resolver Lightweight Node</a:t>
+            </a:r>
+            <a:endParaRPr lang="en-US" sz="1200" b="1" dirty="0">
+              <a:solidFill>
+                <a:schemeClr val="bg1"/>
+              </a:solidFill>
+            </a:endParaRPr>
+          </a:p>
+        </p:txBody>
+      </p:sp>
+      <p:cxnSp>
+        <p:nvCxnSpPr>
+          <p:cNvPr id="109" name="Straight Arrow Connector 108">
+            <a:extLst>
+              <a:ext uri="{FF2B5EF4-FFF2-40B4-BE49-F238E27FC236}">
+                <a16:creationId xmlns:a16="http://schemas.microsoft.com/office/drawing/2014/main" id="{35B59BA0-D7F4-42DC-9114-676D4491209B}"/>
+              </a:ext>
+            </a:extLst>
+          </p:cNvPr>
+          <p:cNvCxnSpPr>
+            <a:cxnSpLocks/>
+            <a:stCxn id="104" idx="2"/>
+            <a:endCxn id="100" idx="0"/>
+          </p:cNvCxnSpPr>
+          <p:nvPr/>
+        </p:nvCxnSpPr>
+        <p:spPr>
+          <a:xfrm flipH="1">
+            <a:off x="2077038" y="1197928"/>
+            <a:ext cx="1603" cy="259199"/>
+          </a:xfrm>
+          <a:prstGeom prst="straightConnector1">
+            <a:avLst/>
+          </a:prstGeom>
+          <a:ln w="38100">
+            <a:solidFill>
+              <a:schemeClr val="tx1"/>
+            </a:solidFill>
+            <a:tailEnd type="triangle"/>
+          </a:ln>
+        </p:spPr>
+        <p:style>
+          <a:lnRef idx="1">
+            <a:schemeClr val="accent1"/>
+          </a:lnRef>
+          <a:fillRef idx="0">
+            <a:schemeClr val="accent1"/>
+          </a:fillRef>
+          <a:effectRef idx="0">
+            <a:schemeClr val="accent1"/>
+          </a:effectRef>
+          <a:fontRef idx="minor">
+            <a:schemeClr val="tx1"/>
+          </a:fontRef>
+        </p:style>
+      </p:cxnSp>
+      <p:cxnSp>
+        <p:nvCxnSpPr>
+          <p:cNvPr id="110" name="Straight Arrow Connector 109">
+            <a:extLst>
+              <a:ext uri="{FF2B5EF4-FFF2-40B4-BE49-F238E27FC236}">
+                <a16:creationId xmlns:a16="http://schemas.microsoft.com/office/drawing/2014/main" id="{50E28F6F-0210-4C70-9221-7302D6A6E950}"/>
+              </a:ext>
+            </a:extLst>
+          </p:cNvPr>
+          <p:cNvCxnSpPr>
+            <a:cxnSpLocks/>
+          </p:cNvCxnSpPr>
+          <p:nvPr/>
+        </p:nvCxnSpPr>
+        <p:spPr>
+          <a:xfrm flipH="1">
+            <a:off x="4660554" y="798916"/>
+            <a:ext cx="3028" cy="181133"/>
+          </a:xfrm>
+          <a:prstGeom prst="straightConnector1">
+            <a:avLst/>
+          </a:prstGeom>
+          <a:ln w="38100">
+            <a:solidFill>
+              <a:schemeClr val="tx1"/>
+            </a:solidFill>
+            <a:tailEnd type="triangle"/>
+          </a:ln>
+        </p:spPr>
+        <p:style>
+          <a:lnRef idx="1">
+            <a:schemeClr val="accent1"/>
+          </a:lnRef>
+          <a:fillRef idx="0">
+            <a:schemeClr val="accent1"/>
+          </a:fillRef>
+          <a:effectRef idx="0">
+            <a:schemeClr val="accent1"/>
+          </a:effectRef>
+          <a:fontRef idx="minor">
+            <a:schemeClr val="tx1"/>
+          </a:fontRef>
+        </p:style>
+      </p:cxnSp>
+      <p:cxnSp>
+        <p:nvCxnSpPr>
+          <p:cNvPr id="111" name="Straight Arrow Connector 110">
+            <a:extLst>
+              <a:ext uri="{FF2B5EF4-FFF2-40B4-BE49-F238E27FC236}">
+                <a16:creationId xmlns:a16="http://schemas.microsoft.com/office/drawing/2014/main" id="{310BE26D-5B63-4C9B-80DC-C0A3B8BC61D0}"/>
+              </a:ext>
+            </a:extLst>
+          </p:cNvPr>
+          <p:cNvCxnSpPr>
+            <a:cxnSpLocks/>
+            <a:stCxn id="108" idx="2"/>
+            <a:endCxn id="106" idx="0"/>
+          </p:cNvCxnSpPr>
+          <p:nvPr/>
+        </p:nvCxnSpPr>
+        <p:spPr>
+          <a:xfrm>
+            <a:off x="4660555" y="1279111"/>
+            <a:ext cx="1" cy="178016"/>
+          </a:xfrm>
+          <a:prstGeom prst="straightConnector1">
+            <a:avLst/>
+          </a:prstGeom>
+          <a:ln w="38100">
+            <a:solidFill>
+              <a:schemeClr val="tx1"/>
+            </a:solidFill>
+            <a:tailEnd type="triangle"/>
+          </a:ln>
+        </p:spPr>
+        <p:style>
+          <a:lnRef idx="1">
+            <a:schemeClr val="accent1"/>
+          </a:lnRef>
+          <a:fillRef idx="0">
+            <a:schemeClr val="accent1"/>
+          </a:fillRef>
+          <a:effectRef idx="0">
+            <a:schemeClr val="accent1"/>
+          </a:effectRef>
+          <a:fontRef idx="minor">
+            <a:schemeClr val="tx1"/>
+          </a:fontRef>
+        </p:style>
+      </p:cxnSp>
+      <p:cxnSp>
+        <p:nvCxnSpPr>
+          <p:cNvPr id="112" name="Straight Arrow Connector 111">
+            <a:extLst>
+              <a:ext uri="{FF2B5EF4-FFF2-40B4-BE49-F238E27FC236}">
+                <a16:creationId xmlns:a16="http://schemas.microsoft.com/office/drawing/2014/main" id="{2A458DF8-5281-49B0-8469-CF2259786301}"/>
+              </a:ext>
+            </a:extLst>
+          </p:cNvPr>
+          <p:cNvCxnSpPr>
+            <a:cxnSpLocks/>
+            <a:stCxn id="97" idx="2"/>
+            <a:endCxn id="86" idx="0"/>
+          </p:cNvCxnSpPr>
+          <p:nvPr/>
+        </p:nvCxnSpPr>
+        <p:spPr>
+          <a:xfrm>
+            <a:off x="4660555" y="2895533"/>
+            <a:ext cx="1" cy="190567"/>
+          </a:xfrm>
+          <a:prstGeom prst="straightConnector1">
+            <a:avLst/>
+          </a:prstGeom>
+          <a:ln w="38100">
+            <a:solidFill>
+              <a:schemeClr val="tx1"/>
+            </a:solidFill>
+            <a:tailEnd type="triangle"/>
+          </a:ln>
+        </p:spPr>
+        <p:style>
+          <a:lnRef idx="1">
+            <a:schemeClr val="accent1"/>
+          </a:lnRef>
+          <a:fillRef idx="0">
+            <a:schemeClr val="accent1"/>
+          </a:fillRef>
+          <a:effectRef idx="0">
+            <a:schemeClr val="accent1"/>
+          </a:effectRef>
+          <a:fontRef idx="minor">
+            <a:schemeClr val="tx1"/>
+          </a:fontRef>
+        </p:style>
+      </p:cxnSp>
+    </p:spTree>
+    <p:extLst>
+      <p:ext uri="{BB962C8B-B14F-4D97-AF65-F5344CB8AC3E}">
+        <p14:creationId xmlns:p14="http://schemas.microsoft.com/office/powerpoint/2010/main" val="3572167793"/>
+      </p:ext>
+    </p:extLst>
+  </p:cSld>
+  <p:clrMapOvr>
+    <a:masterClrMapping/>
+  </p:clrMapOvr>
+</p:sld>
+</file>
+
 <file path=ppt/theme/theme1.xml><?xml version="1.0" encoding="utf-8"?>
 <a:theme xmlns:a="http://schemas.openxmlformats.org/drawingml/2006/main" name="Office Theme">
   <a:themeElements>

</xml_diff>

<commit_message>
"VDR Full Node/Service" to "VDR Node/Service", resp.
</commit_message>
<xml_diff>
--- a/src/HBB-DID-Resolver-Architecture v0.1.pptx
+++ b/src/HBB-DID-Resolver-Architecture v0.1.pptx
@@ -5654,7 +5654,7 @@
                   <a:schemeClr val="bg1"/>
                 </a:solidFill>
               </a:rPr>
-              <a:t>VDR Full Node</a:t>
+              <a:t>VDR Node</a:t>
             </a:r>
             <a:endParaRPr lang="en-US" sz="1200" b="1" dirty="0">
               <a:solidFill>
@@ -5950,7 +5950,7 @@
                     <a:schemeClr val="bg1"/>
                   </a:solidFill>
                 </a:rPr>
-                <a:t>VDR Full Node</a:t>
+                <a:t>VDR Node</a:t>
               </a:r>
               <a:endParaRPr lang="en-US" sz="1200" b="1" dirty="0">
                 <a:solidFill>

</xml_diff>